<commit_message>
Update FAQ & Working to docs
</commit_message>
<xml_diff>
--- a/diagrams.pptx
+++ b/diagrams.pptx
@@ -11969,112 +11969,133 @@
           </a:p>
         </p:txBody>
       </p:sp>
-      <p:sp>
-        <p:nvSpPr>
-          <p:cNvPr id="60" name="TextBox 59">
-            <a:extLst>
-              <a:ext uri="{FF2B5EF4-FFF2-40B4-BE49-F238E27FC236}">
-                <a16:creationId xmlns:a16="http://schemas.microsoft.com/office/drawing/2014/main" id="{43DF8E3E-F738-34E0-483B-2B3EDA18B12B}"/>
-              </a:ext>
-            </a:extLst>
-          </p:cNvPr>
-          <p:cNvSpPr txBox="1"/>
-          <p:nvPr/>
-        </p:nvSpPr>
-        <p:spPr>
-          <a:xfrm>
-            <a:off x="2987869" y="2473558"/>
-            <a:ext cx="1187055" cy="769441"/>
-          </a:xfrm>
-          <a:prstGeom prst="rect">
-            <a:avLst/>
-          </a:prstGeom>
-          <a:noFill/>
-        </p:spPr>
-        <p:txBody>
-          <a:bodyPr wrap="square" rtlCol="0">
-            <a:spAutoFit/>
-          </a:bodyPr>
-          <a:lstStyle/>
-          <a:p>
-            <a:r>
-              <a:rPr lang="en-US" sz="1100" dirty="0"/>
-              <a:t>Home tab can navigate to these default tabs:</a:t>
-            </a:r>
-          </a:p>
-          <a:p>
-            <a:endParaRPr lang="en-US" sz="1100" dirty="0"/>
-          </a:p>
-        </p:txBody>
-      </p:sp>
-      <p:sp>
-        <p:nvSpPr>
-          <p:cNvPr id="61" name="TextBox 60">
-            <a:extLst>
-              <a:ext uri="{FF2B5EF4-FFF2-40B4-BE49-F238E27FC236}">
-                <a16:creationId xmlns:a16="http://schemas.microsoft.com/office/drawing/2014/main" id="{AFA9B27B-79E2-E12B-8298-C6F2782AB3F6}"/>
-              </a:ext>
-            </a:extLst>
-          </p:cNvPr>
-          <p:cNvSpPr txBox="1"/>
-          <p:nvPr/>
-        </p:nvSpPr>
-        <p:spPr>
-          <a:xfrm>
-            <a:off x="3118654" y="3062724"/>
-            <a:ext cx="925483" cy="1277273"/>
-          </a:xfrm>
-          <a:prstGeom prst="rect">
-            <a:avLst/>
-          </a:prstGeom>
-          <a:noFill/>
-        </p:spPr>
-        <p:txBody>
-          <a:bodyPr wrap="square" rtlCol="0">
-            <a:spAutoFit/>
-          </a:bodyPr>
-          <a:lstStyle/>
-          <a:p>
-            <a:r>
-              <a:rPr lang="en-US" sz="1100" dirty="0"/>
-              <a:t>-Individuals</a:t>
-            </a:r>
-          </a:p>
-          <a:p>
-            <a:r>
-              <a:rPr lang="en-US" sz="1100" dirty="0"/>
-              <a:t>-Assets</a:t>
-            </a:r>
-          </a:p>
-          <a:p>
-            <a:r>
-              <a:rPr lang="en-US" sz="1100" dirty="0"/>
-              <a:t>-Income</a:t>
-            </a:r>
-          </a:p>
-          <a:p>
-            <a:r>
-              <a:rPr lang="en-US" sz="1100" dirty="0"/>
-              <a:t>-Budget</a:t>
-            </a:r>
-          </a:p>
-          <a:p>
-            <a:r>
-              <a:rPr lang="en-US" sz="1100" dirty="0"/>
-              <a:t>-Retire</a:t>
-            </a:r>
-          </a:p>
-          <a:p>
-            <a:r>
-              <a:rPr lang="en-US" sz="1100" dirty="0"/>
-              <a:t>-Useful Info</a:t>
-            </a:r>
-          </a:p>
-          <a:p>
-            <a:endParaRPr lang="en-US" sz="1100" dirty="0"/>
-          </a:p>
-        </p:txBody>
-      </p:sp>
+      <p:grpSp>
+        <p:nvGrpSpPr>
+          <p:cNvPr id="77" name="Group 76">
+            <a:extLst>
+              <a:ext uri="{FF2B5EF4-FFF2-40B4-BE49-F238E27FC236}">
+                <a16:creationId xmlns:a16="http://schemas.microsoft.com/office/drawing/2014/main" id="{7DDBFA53-BCD6-3D3A-44F9-00DDBF8E7A9C}"/>
+              </a:ext>
+            </a:extLst>
+          </p:cNvPr>
+          <p:cNvGrpSpPr/>
+          <p:nvPr/>
+        </p:nvGrpSpPr>
+        <p:grpSpPr>
+          <a:xfrm>
+            <a:off x="2969021" y="3076797"/>
+            <a:ext cx="1230898" cy="1866439"/>
+            <a:chOff x="2987869" y="2473558"/>
+            <a:chExt cx="1230898" cy="1866439"/>
+          </a:xfrm>
+        </p:grpSpPr>
+        <p:sp>
+          <p:nvSpPr>
+            <p:cNvPr id="60" name="TextBox 59">
+              <a:extLst>
+                <a:ext uri="{FF2B5EF4-FFF2-40B4-BE49-F238E27FC236}">
+                  <a16:creationId xmlns:a16="http://schemas.microsoft.com/office/drawing/2014/main" id="{43DF8E3E-F738-34E0-483B-2B3EDA18B12B}"/>
+                </a:ext>
+              </a:extLst>
+            </p:cNvPr>
+            <p:cNvSpPr txBox="1"/>
+            <p:nvPr/>
+          </p:nvSpPr>
+          <p:spPr>
+            <a:xfrm>
+              <a:off x="2987869" y="2473558"/>
+              <a:ext cx="1230898" cy="769441"/>
+            </a:xfrm>
+            <a:prstGeom prst="rect">
+              <a:avLst/>
+            </a:prstGeom>
+            <a:noFill/>
+          </p:spPr>
+          <p:txBody>
+            <a:bodyPr wrap="square" rtlCol="0">
+              <a:spAutoFit/>
+            </a:bodyPr>
+            <a:lstStyle/>
+            <a:p>
+              <a:r>
+                <a:rPr lang="en-US" sz="1100" dirty="0"/>
+                <a:t>Home tab can also navigate to these default tabs:</a:t>
+              </a:r>
+            </a:p>
+            <a:p>
+              <a:endParaRPr lang="en-US" sz="1100" dirty="0"/>
+            </a:p>
+          </p:txBody>
+        </p:sp>
+        <p:sp>
+          <p:nvSpPr>
+            <p:cNvPr id="61" name="TextBox 60">
+              <a:extLst>
+                <a:ext uri="{FF2B5EF4-FFF2-40B4-BE49-F238E27FC236}">
+                  <a16:creationId xmlns:a16="http://schemas.microsoft.com/office/drawing/2014/main" id="{AFA9B27B-79E2-E12B-8298-C6F2782AB3F6}"/>
+                </a:ext>
+              </a:extLst>
+            </p:cNvPr>
+            <p:cNvSpPr txBox="1"/>
+            <p:nvPr/>
+          </p:nvSpPr>
+          <p:spPr>
+            <a:xfrm>
+              <a:off x="3118654" y="3062724"/>
+              <a:ext cx="925483" cy="1277273"/>
+            </a:xfrm>
+            <a:prstGeom prst="rect">
+              <a:avLst/>
+            </a:prstGeom>
+            <a:noFill/>
+          </p:spPr>
+          <p:txBody>
+            <a:bodyPr wrap="square" rtlCol="0">
+              <a:spAutoFit/>
+            </a:bodyPr>
+            <a:lstStyle/>
+            <a:p>
+              <a:r>
+                <a:rPr lang="en-US" sz="1100" dirty="0"/>
+                <a:t>-Individuals</a:t>
+              </a:r>
+            </a:p>
+            <a:p>
+              <a:r>
+                <a:rPr lang="en-US" sz="1100" dirty="0"/>
+                <a:t>-Assets</a:t>
+              </a:r>
+            </a:p>
+            <a:p>
+              <a:r>
+                <a:rPr lang="en-US" sz="1100" dirty="0"/>
+                <a:t>-Income</a:t>
+              </a:r>
+            </a:p>
+            <a:p>
+              <a:r>
+                <a:rPr lang="en-US" sz="1100" dirty="0"/>
+                <a:t>-Budget</a:t>
+              </a:r>
+            </a:p>
+            <a:p>
+              <a:r>
+                <a:rPr lang="en-US" sz="1100" dirty="0"/>
+                <a:t>-Retire</a:t>
+              </a:r>
+            </a:p>
+            <a:p>
+              <a:r>
+                <a:rPr lang="en-US" sz="1100" dirty="0"/>
+                <a:t>-Useful Info</a:t>
+              </a:r>
+            </a:p>
+            <a:p>
+              <a:endParaRPr lang="en-US" sz="1100" dirty="0"/>
+            </a:p>
+          </p:txBody>
+        </p:sp>
+      </p:grpSp>
       <p:sp>
         <p:nvSpPr>
           <p:cNvPr id="63" name="TextBox 62">
@@ -12767,6 +12788,77 @@
           <a:p>
             <a:pPr algn="ctr"/>
             <a:endParaRPr lang="en-US"/>
+          </a:p>
+        </p:txBody>
+      </p:sp>
+      <p:sp>
+        <p:nvSpPr>
+          <p:cNvPr id="78" name="Rounded Rectangle 77">
+            <a:extLst>
+              <a:ext uri="{FF2B5EF4-FFF2-40B4-BE49-F238E27FC236}">
+                <a16:creationId xmlns:a16="http://schemas.microsoft.com/office/drawing/2014/main" id="{060BCE95-DF4E-88A4-9341-317EB5D6C3A1}"/>
+              </a:ext>
+            </a:extLst>
+          </p:cNvPr>
+          <p:cNvSpPr/>
+          <p:nvPr/>
+        </p:nvSpPr>
+        <p:spPr>
+          <a:xfrm>
+            <a:off x="3024181" y="2540058"/>
+            <a:ext cx="1014532" cy="312691"/>
+          </a:xfrm>
+          <a:prstGeom prst="roundRect">
+            <a:avLst>
+              <a:gd name="adj" fmla="val 13794"/>
+            </a:avLst>
+          </a:prstGeom>
+          <a:solidFill>
+            <a:schemeClr val="bg1">
+              <a:lumMod val="85000"/>
+            </a:schemeClr>
+          </a:solidFill>
+          <a:ln w="12700">
+            <a:solidFill>
+              <a:schemeClr val="tx1">
+                <a:lumMod val="50000"/>
+                <a:lumOff val="50000"/>
+              </a:schemeClr>
+            </a:solidFill>
+          </a:ln>
+        </p:spPr>
+        <p:style>
+          <a:lnRef idx="2">
+            <a:schemeClr val="accent1">
+              <a:shade val="50000"/>
+            </a:schemeClr>
+          </a:lnRef>
+          <a:fillRef idx="1">
+            <a:schemeClr val="accent1"/>
+          </a:fillRef>
+          <a:effectRef idx="0">
+            <a:schemeClr val="accent1"/>
+          </a:effectRef>
+          <a:fontRef idx="minor">
+            <a:schemeClr val="lt1"/>
+          </a:fontRef>
+        </p:style>
+        <p:txBody>
+          <a:bodyPr rtlCol="0" anchor="ctr"/>
+          <a:lstStyle/>
+          <a:p>
+            <a:pPr algn="ctr"/>
+            <a:r>
+              <a:rPr lang="en-US" sz="1100" dirty="0">
+                <a:solidFill>
+                  <a:schemeClr val="tx1">
+                    <a:lumMod val="65000"/>
+                    <a:lumOff val="35000"/>
+                  </a:schemeClr>
+                </a:solidFill>
+              </a:rPr>
+              <a:t>Settings</a:t>
+            </a:r>
           </a:p>
         </p:txBody>
       </p:sp>

</xml_diff>